<commit_message>
Pequeño arreglo en la ppt y se añadio el diagrama WBS
</commit_message>
<xml_diff>
--- a/Presentaciones/Presentacion_inicial (RF 1).pptx
+++ b/Presentaciones/Presentacion_inicial (RF 1).pptx
@@ -22456,7 +22456,31 @@
                 <a:cs typeface="Georgia"/>
                 <a:sym typeface="Georgia"/>
               </a:rPr>
-              <a:t> haciendo orientada a tareas en vez de funcionalidades</a:t>
+              <a:t> </a:t>
+            </a:r>
+            <a:r>
+              <a:rPr lang="es-ES" sz="2400" b="0" i="0" u="none" strike="noStrike" cap="none" dirty="0" smtClean="0">
+                <a:solidFill>
+                  <a:schemeClr val="dk1"/>
+                </a:solidFill>
+                <a:latin typeface="Georgia"/>
+                <a:ea typeface="Georgia"/>
+                <a:cs typeface="Georgia"/>
+                <a:sym typeface="Georgia"/>
+              </a:rPr>
+              <a:t>orientada </a:t>
+            </a:r>
+            <a:r>
+              <a:rPr lang="es-ES" sz="2400" b="0" i="0" u="none" strike="noStrike" cap="none" dirty="0" smtClean="0">
+                <a:solidFill>
+                  <a:schemeClr val="dk1"/>
+                </a:solidFill>
+                <a:latin typeface="Georgia"/>
+                <a:ea typeface="Georgia"/>
+                <a:cs typeface="Georgia"/>
+                <a:sym typeface="Georgia"/>
+              </a:rPr>
+              <a:t>a tareas en vez de funcionalidades</a:t>
             </a:r>
           </a:p>
           <a:p>
@@ -22554,7 +22578,6 @@
               <a:rPr lang="es-ES" sz="2400" dirty="0"/>
               <a:t>s</a:t>
             </a:r>
-            <a:endParaRPr lang="es-ES" sz="2400" dirty="0"/>
           </a:p>
         </p:txBody>
       </p:sp>
@@ -22623,7 +22646,7 @@
         <p:spPr>
           <a:xfrm>
             <a:off x="457200" y="1143000"/>
-            <a:ext cx="8229600" cy="1066800"/>
+            <a:ext cx="8229600" cy="703385"/>
           </a:xfrm>
           <a:prstGeom prst="rect">
             <a:avLst/>
@@ -22683,7 +22706,7 @@
         </p:nvSpPr>
         <p:spPr>
           <a:xfrm>
-            <a:off x="457200" y="2249425"/>
+            <a:off x="386861" y="1846385"/>
             <a:ext cx="6483000" cy="4325100"/>
           </a:xfrm>
           <a:prstGeom prst="rect">
@@ -22700,7 +22723,7 @@
           </a:bodyPr>
           <a:lstStyle/>
           <a:p>
-            <a:pPr lvl="1" indent="-381000">
+            <a:pPr marL="533400" lvl="1" indent="0">
               <a:spcBef>
                 <a:spcPts val="0"/>
               </a:spcBef>
@@ -22708,20 +22731,11 @@
                 <a:srgbClr val="45818E"/>
               </a:buClr>
               <a:buSzPts val="2400"/>
-              <a:buFont typeface="Georgia"/>
-              <a:buChar char="●"/>
+              <a:buNone/>
             </a:pPr>
             <a:r>
               <a:rPr lang="es-ES" dirty="0" smtClean="0"/>
-              <a:t>Diagrama </a:t>
-            </a:r>
-            <a:r>
-              <a:rPr lang="es-ES" dirty="0" err="1" smtClean="0"/>
-              <a:t>wbs</a:t>
-            </a:r>
-            <a:r>
-              <a:rPr lang="es-ES" dirty="0" smtClean="0"/>
-              <a:t> </a:t>
+              <a:t>Diagrama WBS</a:t>
             </a:r>
             <a:endParaRPr dirty="0"/>
           </a:p>
@@ -22752,6 +22766,37 @@
           <a:ln>
             <a:noFill/>
           </a:ln>
+        </p:spPr>
+      </p:pic>
+      <p:pic>
+        <p:nvPicPr>
+          <p:cNvPr id="5" name="Graphic 1"/>
+          <p:cNvPicPr/>
+          <p:nvPr/>
+        </p:nvPicPr>
+        <p:blipFill>
+          <a:blip r:embed="rId4" cstate="print">
+            <a:extLst>
+              <a:ext uri="{28A0092B-C50C-407E-A947-70E740481C1C}">
+                <a14:useLocalDpi xmlns:a14="http://schemas.microsoft.com/office/drawing/2010/main" val="0"/>
+              </a:ext>
+              <a:ext uri="{96DAC541-7B7A-43D3-8B79-37D633B846F1}">
+                <asvg:svgBlip xmlns="" xmlns:wpc="http://schemas.microsoft.com/office/word/2010/wordprocessingCanvas" xmlns:cx="http://schemas.microsoft.com/office/drawing/2014/chartex" xmlns:cx1="http://schemas.microsoft.com/office/drawing/2015/9/8/chartex" xmlns:cx2="http://schemas.microsoft.com/office/drawing/2015/10/21/chartex" xmlns:cx3="http://schemas.microsoft.com/office/drawing/2016/5/9/chartex" xmlns:cx4="http://schemas.microsoft.com/office/drawing/2016/5/10/chartex" xmlns:cx5="http://schemas.microsoft.com/office/drawing/2016/5/11/chartex" xmlns:cx6="http://schemas.microsoft.com/office/drawing/2016/5/12/chartex" xmlns:cx7="http://schemas.microsoft.com/office/drawing/2016/5/13/chartex" xmlns:cx8="http://schemas.microsoft.com/office/drawing/2016/5/14/chartex" xmlns:mc="http://schemas.openxmlformats.org/markup-compatibility/2006" xmlns:aink="http://schemas.microsoft.com/office/drawing/2016/ink" xmlns:am3d="http://schemas.microsoft.com/office/drawing/2017/model3d" xmlns:o="urn:schemas-microsoft-com:office:office" xmlns:oel="http://schemas.microsoft.com/office/2019/extlst" xmlns:m="http://schemas.openxmlformats.org/officeDocument/2006/math" xmlns:v="urn:schemas-microsoft-com:vml" xmlns:wp14="http://schemas.microsoft.com/office/word/2010/wordprocessingDrawing" xmlns:wp="http://schemas.openxmlformats.org/drawingml/2006/wordprocessingDrawing" xmlns:w10="urn:schemas-microsoft-com:office:word" xmlns:w="http://schemas.openxmlformats.org/wordprocessingml/2006/main" xmlns:w14="http://schemas.microsoft.com/office/word/2010/wordml" xmlns:w15="http://schemas.microsoft.com/office/word/2012/wordml" xmlns:w16cex="http://schemas.microsoft.com/office/word/2018/wordml/cex" xmlns:w16cid="http://schemas.microsoft.com/office/word/2016/wordml/cid" xmlns:w16="http://schemas.microsoft.com/office/word/2018/wordml" xmlns:w16du="http://schemas.microsoft.com/office/word/2023/wordml/word16du" xmlns:w16sdtdh="http://schemas.microsoft.com/office/word/2020/wordml/sdtdatahash" xmlns:w16se="http://schemas.microsoft.com/office/word/2015/wordml/symex" xmlns:wpg="http://schemas.microsoft.com/office/word/2010/wordprocessingGroup" xmlns:wpi="http://schemas.microsoft.com/office/word/2010/wordprocessingInk" xmlns:wne="http://schemas.microsoft.com/office/word/2006/wordml" xmlns:wps="http://schemas.microsoft.com/office/word/2010/wordprocessingShape" xmlns:pic="http://schemas.openxmlformats.org/drawingml/2006/picture" xmlns:asvg="http://schemas.microsoft.com/office/drawing/2016/SVG/main" xmlns:lc="http://schemas.openxmlformats.org/drawingml/2006/lockedCanvas" r:embed="rId19"/>
+              </a:ext>
+            </a:extLst>
+          </a:blip>
+          <a:stretch>
+            <a:fillRect/>
+          </a:stretch>
+        </p:blipFill>
+        <p:spPr>
+          <a:xfrm>
+            <a:off x="625592" y="2338753"/>
+            <a:ext cx="6420876" cy="3832731"/>
+          </a:xfrm>
+          <a:prstGeom prst="rect">
+            <a:avLst/>
+          </a:prstGeom>
         </p:spPr>
       </p:pic>
     </p:spTree>

</xml_diff>